<commit_message>
Update Biomass Blockchain architecture
Update Biomass Blockchain architecture
</commit_message>
<xml_diff>
--- a/biochain/biomass.pptx
+++ b/biochain/biomass.pptx
@@ -197,7 +197,7 @@
           <a:p>
             <a:fld id="{6A1FD68F-C029-4419-99B4-E63DBA0579DA}" type="datetimeFigureOut">
               <a:rPr lang="en-US" smtClean="0"/>
-              <a:t>4/12/2023</a:t>
+              <a:t>5/5/2023</a:t>
             </a:fld>
             <a:endParaRPr lang="en-US"/>
           </a:p>
@@ -695,7 +695,7 @@
           <a:p>
             <a:fld id="{4A16E71D-B828-4676-B132-BECEC98B26CA}" type="datetimeFigureOut">
               <a:rPr lang="en-US" smtClean="0"/>
-              <a:t>4/12/2023</a:t>
+              <a:t>5/5/2023</a:t>
             </a:fld>
             <a:endParaRPr lang="en-US"/>
           </a:p>
@@ -893,7 +893,7 @@
           <a:p>
             <a:fld id="{4A16E71D-B828-4676-B132-BECEC98B26CA}" type="datetimeFigureOut">
               <a:rPr lang="en-US" smtClean="0"/>
-              <a:t>4/12/2023</a:t>
+              <a:t>5/5/2023</a:t>
             </a:fld>
             <a:endParaRPr lang="en-US"/>
           </a:p>
@@ -1101,7 +1101,7 @@
           <a:p>
             <a:fld id="{4A16E71D-B828-4676-B132-BECEC98B26CA}" type="datetimeFigureOut">
               <a:rPr lang="en-US" smtClean="0"/>
-              <a:t>4/12/2023</a:t>
+              <a:t>5/5/2023</a:t>
             </a:fld>
             <a:endParaRPr lang="en-US"/>
           </a:p>
@@ -1299,7 +1299,7 @@
           <a:p>
             <a:fld id="{4A16E71D-B828-4676-B132-BECEC98B26CA}" type="datetimeFigureOut">
               <a:rPr lang="en-US" smtClean="0"/>
-              <a:t>4/12/2023</a:t>
+              <a:t>5/5/2023</a:t>
             </a:fld>
             <a:endParaRPr lang="en-US"/>
           </a:p>
@@ -1574,7 +1574,7 @@
           <a:p>
             <a:fld id="{4A16E71D-B828-4676-B132-BECEC98B26CA}" type="datetimeFigureOut">
               <a:rPr lang="en-US" smtClean="0"/>
-              <a:t>4/12/2023</a:t>
+              <a:t>5/5/2023</a:t>
             </a:fld>
             <a:endParaRPr lang="en-US"/>
           </a:p>
@@ -1839,7 +1839,7 @@
           <a:p>
             <a:fld id="{4A16E71D-B828-4676-B132-BECEC98B26CA}" type="datetimeFigureOut">
               <a:rPr lang="en-US" smtClean="0"/>
-              <a:t>4/12/2023</a:t>
+              <a:t>5/5/2023</a:t>
             </a:fld>
             <a:endParaRPr lang="en-US"/>
           </a:p>
@@ -2251,7 +2251,7 @@
           <a:p>
             <a:fld id="{4A16E71D-B828-4676-B132-BECEC98B26CA}" type="datetimeFigureOut">
               <a:rPr lang="en-US" smtClean="0"/>
-              <a:t>4/12/2023</a:t>
+              <a:t>5/5/2023</a:t>
             </a:fld>
             <a:endParaRPr lang="en-US"/>
           </a:p>
@@ -2392,7 +2392,7 @@
           <a:p>
             <a:fld id="{4A16E71D-B828-4676-B132-BECEC98B26CA}" type="datetimeFigureOut">
               <a:rPr lang="en-US" smtClean="0"/>
-              <a:t>4/12/2023</a:t>
+              <a:t>5/5/2023</a:t>
             </a:fld>
             <a:endParaRPr lang="en-US"/>
           </a:p>
@@ -2505,7 +2505,7 @@
           <a:p>
             <a:fld id="{4A16E71D-B828-4676-B132-BECEC98B26CA}" type="datetimeFigureOut">
               <a:rPr lang="en-US" smtClean="0"/>
-              <a:t>4/12/2023</a:t>
+              <a:t>5/5/2023</a:t>
             </a:fld>
             <a:endParaRPr lang="en-US"/>
           </a:p>
@@ -2816,7 +2816,7 @@
           <a:p>
             <a:fld id="{4A16E71D-B828-4676-B132-BECEC98B26CA}" type="datetimeFigureOut">
               <a:rPr lang="en-US" smtClean="0"/>
-              <a:t>4/12/2023</a:t>
+              <a:t>5/5/2023</a:t>
             </a:fld>
             <a:endParaRPr lang="en-US"/>
           </a:p>
@@ -3104,7 +3104,7 @@
           <a:p>
             <a:fld id="{4A16E71D-B828-4676-B132-BECEC98B26CA}" type="datetimeFigureOut">
               <a:rPr lang="en-US" smtClean="0"/>
-              <a:t>4/12/2023</a:t>
+              <a:t>5/5/2023</a:t>
             </a:fld>
             <a:endParaRPr lang="en-US"/>
           </a:p>
@@ -3345,7 +3345,7 @@
           <a:p>
             <a:fld id="{4A16E71D-B828-4676-B132-BECEC98B26CA}" type="datetimeFigureOut">
               <a:rPr lang="en-US" smtClean="0"/>
-              <a:t>4/12/2023</a:t>
+              <a:t>5/5/2023</a:t>
             </a:fld>
             <a:endParaRPr lang="en-US"/>
           </a:p>
@@ -3762,6 +3762,169 @@
           <a:chExt cx="0" cy="0"/>
         </a:xfrm>
       </p:grpSpPr>
+      <p:pic>
+        <p:nvPicPr>
+          <p:cNvPr id="3" name="Picture 2">
+            <a:extLst>
+              <a:ext uri="{FF2B5EF4-FFF2-40B4-BE49-F238E27FC236}">
+                <a16:creationId xmlns:a16="http://schemas.microsoft.com/office/drawing/2014/main" id="{F2A9089C-A187-45E2-8648-83CA4D5D3530}"/>
+              </a:ext>
+            </a:extLst>
+          </p:cNvPr>
+          <p:cNvPicPr>
+            <a:picLocks noChangeAspect="1"/>
+          </p:cNvPicPr>
+          <p:nvPr/>
+        </p:nvPicPr>
+        <p:blipFill>
+          <a:blip r:embed="rId3">
+            <a:extLst>
+              <a:ext uri="{28A0092B-C50C-407E-A947-70E740481C1C}">
+                <a14:useLocalDpi xmlns:a14="http://schemas.microsoft.com/office/drawing/2010/main" val="0"/>
+              </a:ext>
+            </a:extLst>
+          </a:blip>
+          <a:stretch>
+            <a:fillRect/>
+          </a:stretch>
+        </p:blipFill>
+        <p:spPr>
+          <a:xfrm>
+            <a:off x="82999" y="1715462"/>
+            <a:ext cx="12039415" cy="3407382"/>
+          </a:xfrm>
+          <a:prstGeom prst="rect">
+            <a:avLst/>
+          </a:prstGeom>
+        </p:spPr>
+      </p:pic>
+      <p:sp>
+        <p:nvSpPr>
+          <p:cNvPr id="4" name="TextBox 3">
+            <a:extLst>
+              <a:ext uri="{FF2B5EF4-FFF2-40B4-BE49-F238E27FC236}">
+                <a16:creationId xmlns:a16="http://schemas.microsoft.com/office/drawing/2014/main" id="{D9329562-2DBC-4819-9BC7-0FCBCC7505CC}"/>
+              </a:ext>
+            </a:extLst>
+          </p:cNvPr>
+          <p:cNvSpPr txBox="1"/>
+          <p:nvPr/>
+        </p:nvSpPr>
+        <p:spPr>
+          <a:xfrm>
+            <a:off x="3216925" y="2478795"/>
+            <a:ext cx="2049138" cy="2123658"/>
+          </a:xfrm>
+          <a:prstGeom prst="rect">
+            <a:avLst/>
+          </a:prstGeom>
+          <a:noFill/>
+        </p:spPr>
+        <p:txBody>
+          <a:bodyPr wrap="square" rtlCol="0">
+            <a:spAutoFit/>
+          </a:bodyPr>
+          <a:lstStyle/>
+          <a:p>
+            <a:r>
+              <a:rPr lang="en-US" sz="1100" dirty="0"/>
+              <a:t>createBiomass</a:t>
+            </a:r>
+          </a:p>
+          <a:p>
+            <a:r>
+              <a:rPr lang="en-US" sz="1100" dirty="0"/>
+              <a:t>createFarmer</a:t>
+            </a:r>
+          </a:p>
+          <a:p>
+            <a:endParaRPr lang="en-US" sz="1100" dirty="0"/>
+          </a:p>
+          <a:p>
+            <a:r>
+              <a:rPr lang="en-US" sz="1100" dirty="0"/>
+              <a:t>queryBiomass</a:t>
+            </a:r>
+          </a:p>
+          <a:p>
+            <a:r>
+              <a:rPr lang="en-US" sz="1100" dirty="0"/>
+              <a:t>queryFarmer</a:t>
+            </a:r>
+          </a:p>
+          <a:p>
+            <a:endParaRPr lang="en-US" sz="1100" dirty="0"/>
+          </a:p>
+          <a:p>
+            <a:r>
+              <a:rPr lang="en-US" sz="1100" dirty="0"/>
+              <a:t>queryBiomassProperties</a:t>
+            </a:r>
+          </a:p>
+          <a:p>
+            <a:r>
+              <a:rPr lang="en-US" sz="1100" dirty="0"/>
+              <a:t>queryFarmerProperties</a:t>
+            </a:r>
+          </a:p>
+          <a:p>
+            <a:endParaRPr lang="en-US" sz="1100" dirty="0"/>
+          </a:p>
+          <a:p>
+            <a:r>
+              <a:rPr lang="en-US" sz="1100" dirty="0"/>
+              <a:t>updateBiomassProperties</a:t>
+            </a:r>
+          </a:p>
+          <a:p>
+            <a:r>
+              <a:rPr lang="en-US" sz="1100" dirty="0"/>
+              <a:t>updateFarmerProperties</a:t>
+            </a:r>
+          </a:p>
+          <a:p>
+            <a:r>
+              <a:rPr lang="en-US" sz="1100" dirty="0"/>
+              <a:t>transferBiomass</a:t>
+            </a:r>
+          </a:p>
+        </p:txBody>
+      </p:sp>
+      <p:sp>
+        <p:nvSpPr>
+          <p:cNvPr id="5" name="TextBox 4">
+            <a:extLst>
+              <a:ext uri="{FF2B5EF4-FFF2-40B4-BE49-F238E27FC236}">
+                <a16:creationId xmlns:a16="http://schemas.microsoft.com/office/drawing/2014/main" id="{30C742B7-EFEA-4896-8A8A-54A229FA420F}"/>
+              </a:ext>
+            </a:extLst>
+          </p:cNvPr>
+          <p:cNvSpPr txBox="1"/>
+          <p:nvPr/>
+        </p:nvSpPr>
+        <p:spPr>
+          <a:xfrm>
+            <a:off x="8215258" y="2294129"/>
+            <a:ext cx="3815161" cy="369332"/>
+          </a:xfrm>
+          <a:prstGeom prst="rect">
+            <a:avLst/>
+          </a:prstGeom>
+          <a:noFill/>
+        </p:spPr>
+        <p:txBody>
+          <a:bodyPr wrap="square" rtlCol="0">
+            <a:spAutoFit/>
+          </a:bodyPr>
+          <a:lstStyle/>
+          <a:p>
+            <a:r>
+              <a:rPr lang="en-US" dirty="0"/>
+              <a:t>Species; Carbon Saved; Revenue Made</a:t>
+            </a:r>
+          </a:p>
+        </p:txBody>
+      </p:sp>
     </p:spTree>
     <p:extLst>
       <p:ext uri="{BB962C8B-B14F-4D97-AF65-F5344CB8AC3E}">

</xml_diff>